<commit_message>
add: import statement in pe soln
</commit_message>
<xml_diff>
--- a/Tutorials/CS1010X_tut06.pptx
+++ b/Tutorials/CS1010X_tut06.pptx
@@ -174,7 +174,7 @@
   <pc:docChgLst>
     <pc:chgData name="Hugo Khaou" userId="f62992148604c59e" providerId="LiveId" clId="{9974F79C-D5E7-4FF6-86F1-3931D9A45362}"/>
     <pc:docChg chg="custSel modSld">
-      <pc:chgData name="Hugo Khaou" userId="f62992148604c59e" providerId="LiveId" clId="{9974F79C-D5E7-4FF6-86F1-3931D9A45362}" dt="2025-04-19T14:17:17.501" v="127" actId="14100"/>
+      <pc:chgData name="Hugo Khaou" userId="f62992148604c59e" providerId="LiveId" clId="{9974F79C-D5E7-4FF6-86F1-3931D9A45362}" dt="2025-04-24T14:53:37.900" v="131" actId="20577"/>
       <pc:docMkLst>
         <pc:docMk/>
       </pc:docMkLst>
@@ -214,22 +214,6 @@
           <pc:docMk/>
           <pc:sldMk cId="2611699969" sldId="280"/>
         </pc:sldMkLst>
-        <pc:picChg chg="del">
-          <ac:chgData name="Hugo Khaou" userId="f62992148604c59e" providerId="LiveId" clId="{9974F79C-D5E7-4FF6-86F1-3931D9A45362}" dt="2025-04-19T14:12:41.368" v="119" actId="478"/>
-          <ac:picMkLst>
-            <pc:docMk/>
-            <pc:sldMk cId="2611699969" sldId="280"/>
-            <ac:picMk id="4" creationId="{2116AABC-856E-9321-B49C-C80CDEFA5453}"/>
-          </ac:picMkLst>
-        </pc:picChg>
-        <pc:picChg chg="add del mod">
-          <ac:chgData name="Hugo Khaou" userId="f62992148604c59e" providerId="LiveId" clId="{9974F79C-D5E7-4FF6-86F1-3931D9A45362}" dt="2025-04-19T14:17:12.210" v="123" actId="478"/>
-          <ac:picMkLst>
-            <pc:docMk/>
-            <pc:sldMk cId="2611699969" sldId="280"/>
-            <ac:picMk id="7" creationId="{45921934-7605-D4E7-AAD6-4258D0D1E9A0}"/>
-          </ac:picMkLst>
-        </pc:picChg>
         <pc:picChg chg="add mod">
           <ac:chgData name="Hugo Khaou" userId="f62992148604c59e" providerId="LiveId" clId="{9974F79C-D5E7-4FF6-86F1-3931D9A45362}" dt="2025-04-19T14:17:17.501" v="127" actId="14100"/>
           <ac:picMkLst>
@@ -238,6 +222,21 @@
             <ac:picMk id="9" creationId="{C05298BF-C8D5-9989-D711-B27E81CCF79D}"/>
           </ac:picMkLst>
         </pc:picChg>
+      </pc:sldChg>
+      <pc:sldChg chg="modSp mod">
+        <pc:chgData name="Hugo Khaou" userId="f62992148604c59e" providerId="LiveId" clId="{9974F79C-D5E7-4FF6-86F1-3931D9A45362}" dt="2025-04-24T14:53:37.900" v="131" actId="20577"/>
+        <pc:sldMkLst>
+          <pc:docMk/>
+          <pc:sldMk cId="2112854879" sldId="285"/>
+        </pc:sldMkLst>
+        <pc:spChg chg="mod">
+          <ac:chgData name="Hugo Khaou" userId="f62992148604c59e" providerId="LiveId" clId="{9974F79C-D5E7-4FF6-86F1-3931D9A45362}" dt="2025-04-24T14:53:37.900" v="131" actId="20577"/>
+          <ac:spMkLst>
+            <pc:docMk/>
+            <pc:sldMk cId="2112854879" sldId="285"/>
+            <ac:spMk id="5" creationId="{5733B5C7-9458-B819-2678-231FC3B18748}"/>
+          </ac:spMkLst>
+        </pc:spChg>
       </pc:sldChg>
       <pc:sldChg chg="modSp mod">
         <pc:chgData name="Hugo Khaou" userId="f62992148604c59e" providerId="LiveId" clId="{9974F79C-D5E7-4FF6-86F1-3931D9A45362}" dt="2025-04-19T14:08:32.301" v="118" actId="20577"/>
@@ -2298,7 +2297,7 @@
           <a:p>
             <a:fld id="{A94ECBC9-57FF-4888-BEA3-57B4DD65BB06}" type="datetimeFigureOut">
               <a:rPr lang="en-SG" smtClean="0"/>
-              <a:t>19/4/2025</a:t>
+              <a:t>24/4/2025</a:t>
             </a:fld>
             <a:endParaRPr lang="en-SG"/>
           </a:p>
@@ -2850,7 +2849,7 @@
           <a:p>
             <a:fld id="{2154B355-5160-45E8-956A-145AA915337E}" type="datetimeFigureOut">
               <a:rPr lang="en-SG" smtClean="0"/>
-              <a:t>19/4/2025</a:t>
+              <a:t>24/4/2025</a:t>
             </a:fld>
             <a:endParaRPr lang="en-SG"/>
           </a:p>
@@ -3074,7 +3073,7 @@
           <a:p>
             <a:fld id="{2154B355-5160-45E8-956A-145AA915337E}" type="datetimeFigureOut">
               <a:rPr lang="en-SG" smtClean="0"/>
-              <a:t>19/4/2025</a:t>
+              <a:t>24/4/2025</a:t>
             </a:fld>
             <a:endParaRPr lang="en-SG"/>
           </a:p>
@@ -3254,7 +3253,7 @@
           <a:p>
             <a:fld id="{2154B355-5160-45E8-956A-145AA915337E}" type="datetimeFigureOut">
               <a:rPr lang="en-SG" smtClean="0"/>
-              <a:t>19/4/2025</a:t>
+              <a:t>24/4/2025</a:t>
             </a:fld>
             <a:endParaRPr lang="en-SG"/>
           </a:p>
@@ -3424,7 +3423,7 @@
           <a:p>
             <a:fld id="{2154B355-5160-45E8-956A-145AA915337E}" type="datetimeFigureOut">
               <a:rPr lang="en-SG" smtClean="0"/>
-              <a:t>19/4/2025</a:t>
+              <a:t>24/4/2025</a:t>
             </a:fld>
             <a:endParaRPr lang="en-SG"/>
           </a:p>
@@ -3715,7 +3714,7 @@
           <a:p>
             <a:fld id="{2154B355-5160-45E8-956A-145AA915337E}" type="datetimeFigureOut">
               <a:rPr lang="en-SG" smtClean="0"/>
-              <a:t>19/4/2025</a:t>
+              <a:t>24/4/2025</a:t>
             </a:fld>
             <a:endParaRPr lang="en-SG"/>
           </a:p>
@@ -4041,7 +4040,7 @@
           <a:p>
             <a:fld id="{2154B355-5160-45E8-956A-145AA915337E}" type="datetimeFigureOut">
               <a:rPr lang="en-SG" smtClean="0"/>
-              <a:t>19/4/2025</a:t>
+              <a:t>24/4/2025</a:t>
             </a:fld>
             <a:endParaRPr lang="en-SG"/>
           </a:p>
@@ -4453,7 +4452,7 @@
           <a:p>
             <a:fld id="{2154B355-5160-45E8-956A-145AA915337E}" type="datetimeFigureOut">
               <a:rPr lang="en-SG" smtClean="0"/>
-              <a:t>19/4/2025</a:t>
+              <a:t>24/4/2025</a:t>
             </a:fld>
             <a:endParaRPr lang="en-SG"/>
           </a:p>
@@ -4571,7 +4570,7 @@
           <a:p>
             <a:fld id="{2154B355-5160-45E8-956A-145AA915337E}" type="datetimeFigureOut">
               <a:rPr lang="en-SG" smtClean="0"/>
-              <a:t>19/4/2025</a:t>
+              <a:t>24/4/2025</a:t>
             </a:fld>
             <a:endParaRPr lang="en-SG"/>
           </a:p>
@@ -4666,7 +4665,7 @@
           <a:p>
             <a:fld id="{2154B355-5160-45E8-956A-145AA915337E}" type="datetimeFigureOut">
               <a:rPr lang="en-SG" smtClean="0"/>
-              <a:t>19/4/2025</a:t>
+              <a:t>24/4/2025</a:t>
             </a:fld>
             <a:endParaRPr lang="en-SG"/>
           </a:p>
@@ -4953,7 +4952,7 @@
           <a:p>
             <a:fld id="{2154B355-5160-45E8-956A-145AA915337E}" type="datetimeFigureOut">
               <a:rPr lang="en-SG" smtClean="0"/>
-              <a:t>19/4/2025</a:t>
+              <a:t>24/4/2025</a:t>
             </a:fld>
             <a:endParaRPr lang="en-SG"/>
           </a:p>
@@ -5230,7 +5229,7 @@
           <a:p>
             <a:fld id="{2154B355-5160-45E8-956A-145AA915337E}" type="datetimeFigureOut">
               <a:rPr lang="en-SG" smtClean="0"/>
-              <a:t>19/4/2025</a:t>
+              <a:t>24/4/2025</a:t>
             </a:fld>
             <a:endParaRPr lang="en-SG"/>
           </a:p>
@@ -5481,7 +5480,7 @@
           <a:p>
             <a:fld id="{2154B355-5160-45E8-956A-145AA915337E}" type="datetimeFigureOut">
               <a:rPr lang="en-SG" smtClean="0"/>
-              <a:t>19/4/2025</a:t>
+              <a:t>24/4/2025</a:t>
             </a:fld>
             <a:endParaRPr lang="en-SG"/>
           </a:p>
@@ -8317,7 +8316,7 @@
           <a:p>
             <a:r>
               <a:rPr lang="en-US" i="1" dirty="0"/>
-              <a:t>m is the number of cols</a:t>
+              <a:t>m is the number of rows</a:t>
             </a:r>
           </a:p>
         </p:txBody>

</xml_diff>